<commit_message>
updtae dynamic data + présenatation
</commit_message>
<xml_diff>
--- a/TD_5/TD_analyse_sensibilité.pptx
+++ b/TD_5/TD_analyse_sensibilité.pptx
@@ -5,7 +5,7 @@
     <p:sldMasterId id="2147483648" r:id="rId1"/>
   </p:sldMasterIdLst>
   <p:notesMasterIdLst>
-    <p:notesMasterId r:id="rId16"/>
+    <p:notesMasterId r:id="rId17"/>
   </p:notesMasterIdLst>
   <p:sldIdLst>
     <p:sldId id="257" r:id="rId2"/>
@@ -22,6 +22,7 @@
     <p:sldId id="269" r:id="rId13"/>
     <p:sldId id="268" r:id="rId14"/>
     <p:sldId id="270" r:id="rId15"/>
+    <p:sldId id="271" r:id="rId16"/>
   </p:sldIdLst>
   <p:sldSz cx="9144000" cy="6858000" type="screen4x3"/>
   <p:notesSz cx="6858000" cy="9144000"/>
@@ -205,7 +206,7 @@
           <a:p>
             <a:fld id="{9A2158C3-65DB-4784-B113-15FECC4D57FD}" type="datetimeFigureOut">
               <a:rPr lang="en-US" smtClean="0"/>
-              <a:t>6/4/2018</a:t>
+              <a:t>6/5/2018</a:t>
             </a:fld>
             <a:endParaRPr lang="en-US"/>
           </a:p>
@@ -809,6 +810,90 @@
 </p:notes>
 </file>
 
+<file path=ppt/notesSlides/notesSlide13.xml><?xml version="1.0" encoding="utf-8"?>
+<p:notes xmlns:a="http://schemas.openxmlformats.org/drawingml/2006/main" xmlns:r="http://schemas.openxmlformats.org/officeDocument/2006/relationships" xmlns:p="http://schemas.openxmlformats.org/presentationml/2006/main">
+  <p:cSld>
+    <p:spTree>
+      <p:nvGrpSpPr>
+        <p:cNvPr id="1" name=""/>
+        <p:cNvGrpSpPr/>
+        <p:nvPr/>
+      </p:nvGrpSpPr>
+      <p:grpSpPr>
+        <a:xfrm>
+          <a:off x="0" y="0"/>
+          <a:ext cx="0" cy="0"/>
+          <a:chOff x="0" y="0"/>
+          <a:chExt cx="0" cy="0"/>
+        </a:xfrm>
+      </p:grpSpPr>
+      <p:sp>
+        <p:nvSpPr>
+          <p:cNvPr id="2" name="Espace réservé de l'image des diapositives 1"/>
+          <p:cNvSpPr>
+            <a:spLocks noGrp="1" noRot="1" noChangeAspect="1"/>
+          </p:cNvSpPr>
+          <p:nvPr>
+            <p:ph type="sldImg"/>
+          </p:nvPr>
+        </p:nvSpPr>
+        <p:spPr/>
+      </p:sp>
+      <p:sp>
+        <p:nvSpPr>
+          <p:cNvPr id="3" name="Espace réservé des commentaires 2"/>
+          <p:cNvSpPr>
+            <a:spLocks noGrp="1"/>
+          </p:cNvSpPr>
+          <p:nvPr>
+            <p:ph type="body" idx="1"/>
+          </p:nvPr>
+        </p:nvSpPr>
+        <p:spPr/>
+        <p:txBody>
+          <a:bodyPr/>
+          <a:lstStyle/>
+          <a:p>
+            <a:endParaRPr lang="en-US"/>
+          </a:p>
+        </p:txBody>
+      </p:sp>
+      <p:sp>
+        <p:nvSpPr>
+          <p:cNvPr id="4" name="Espace réservé du numéro de diapositive 3"/>
+          <p:cNvSpPr>
+            <a:spLocks noGrp="1"/>
+          </p:cNvSpPr>
+          <p:nvPr>
+            <p:ph type="sldNum" sz="quarter" idx="10"/>
+          </p:nvPr>
+        </p:nvSpPr>
+        <p:spPr/>
+        <p:txBody>
+          <a:bodyPr/>
+          <a:lstStyle/>
+          <a:p>
+            <a:fld id="{F1844487-65EE-4ACA-8B97-3FEF03FAC5B9}" type="slidenum">
+              <a:rPr lang="en-US" smtClean="0"/>
+              <a:t>15</a:t>
+            </a:fld>
+            <a:endParaRPr lang="en-US"/>
+          </a:p>
+        </p:txBody>
+      </p:sp>
+    </p:spTree>
+    <p:extLst>
+      <p:ext uri="{BB962C8B-B14F-4D97-AF65-F5344CB8AC3E}">
+        <p14:creationId xmlns:p14="http://schemas.microsoft.com/office/powerpoint/2010/main" val="3801965965"/>
+      </p:ext>
+    </p:extLst>
+  </p:cSld>
+  <p:clrMapOvr>
+    <a:masterClrMapping/>
+  </p:clrMapOvr>
+</p:notes>
+</file>
+
 <file path=ppt/notesSlides/notesSlide2.xml><?xml version="1.0" encoding="utf-8"?>
 <p:notes xmlns:a="http://schemas.openxmlformats.org/drawingml/2006/main" xmlns:r="http://schemas.openxmlformats.org/officeDocument/2006/relationships" xmlns:p="http://schemas.openxmlformats.org/presentationml/2006/main">
   <p:cSld>
@@ -1662,7 +1747,7 @@
           <a:p>
             <a:fld id="{F1D7F553-83A2-474A-AF03-A72461EB2CE0}" type="datetimeFigureOut">
               <a:rPr lang="en-US" smtClean="0"/>
-              <a:t>6/4/2018</a:t>
+              <a:t>6/5/2018</a:t>
             </a:fld>
             <a:endParaRPr lang="en-US"/>
           </a:p>
@@ -1832,7 +1917,7 @@
           <a:p>
             <a:fld id="{F1D7F553-83A2-474A-AF03-A72461EB2CE0}" type="datetimeFigureOut">
               <a:rPr lang="en-US" smtClean="0"/>
-              <a:t>6/4/2018</a:t>
+              <a:t>6/5/2018</a:t>
             </a:fld>
             <a:endParaRPr lang="en-US"/>
           </a:p>
@@ -2012,7 +2097,7 @@
           <a:p>
             <a:fld id="{F1D7F553-83A2-474A-AF03-A72461EB2CE0}" type="datetimeFigureOut">
               <a:rPr lang="en-US" smtClean="0"/>
-              <a:t>6/4/2018</a:t>
+              <a:t>6/5/2018</a:t>
             </a:fld>
             <a:endParaRPr lang="en-US"/>
           </a:p>
@@ -2182,7 +2267,7 @@
           <a:p>
             <a:fld id="{F1D7F553-83A2-474A-AF03-A72461EB2CE0}" type="datetimeFigureOut">
               <a:rPr lang="en-US" smtClean="0"/>
-              <a:t>6/4/2018</a:t>
+              <a:t>6/5/2018</a:t>
             </a:fld>
             <a:endParaRPr lang="en-US"/>
           </a:p>
@@ -2428,7 +2513,7 @@
           <a:p>
             <a:fld id="{F1D7F553-83A2-474A-AF03-A72461EB2CE0}" type="datetimeFigureOut">
               <a:rPr lang="en-US" smtClean="0"/>
-              <a:t>6/4/2018</a:t>
+              <a:t>6/5/2018</a:t>
             </a:fld>
             <a:endParaRPr lang="en-US"/>
           </a:p>
@@ -2716,7 +2801,7 @@
           <a:p>
             <a:fld id="{F1D7F553-83A2-474A-AF03-A72461EB2CE0}" type="datetimeFigureOut">
               <a:rPr lang="en-US" smtClean="0"/>
-              <a:t>6/4/2018</a:t>
+              <a:t>6/5/2018</a:t>
             </a:fld>
             <a:endParaRPr lang="en-US"/>
           </a:p>
@@ -3138,7 +3223,7 @@
           <a:p>
             <a:fld id="{F1D7F553-83A2-474A-AF03-A72461EB2CE0}" type="datetimeFigureOut">
               <a:rPr lang="en-US" smtClean="0"/>
-              <a:t>6/4/2018</a:t>
+              <a:t>6/5/2018</a:t>
             </a:fld>
             <a:endParaRPr lang="en-US"/>
           </a:p>
@@ -3256,7 +3341,7 @@
           <a:p>
             <a:fld id="{F1D7F553-83A2-474A-AF03-A72461EB2CE0}" type="datetimeFigureOut">
               <a:rPr lang="en-US" smtClean="0"/>
-              <a:t>6/4/2018</a:t>
+              <a:t>6/5/2018</a:t>
             </a:fld>
             <a:endParaRPr lang="en-US"/>
           </a:p>
@@ -3351,7 +3436,7 @@
           <a:p>
             <a:fld id="{F1D7F553-83A2-474A-AF03-A72461EB2CE0}" type="datetimeFigureOut">
               <a:rPr lang="en-US" smtClean="0"/>
-              <a:t>6/4/2018</a:t>
+              <a:t>6/5/2018</a:t>
             </a:fld>
             <a:endParaRPr lang="en-US"/>
           </a:p>
@@ -3628,7 +3713,7 @@
           <a:p>
             <a:fld id="{F1D7F553-83A2-474A-AF03-A72461EB2CE0}" type="datetimeFigureOut">
               <a:rPr lang="en-US" smtClean="0"/>
-              <a:t>6/4/2018</a:t>
+              <a:t>6/5/2018</a:t>
             </a:fld>
             <a:endParaRPr lang="en-US"/>
           </a:p>
@@ -3881,7 +3966,7 @@
           <a:p>
             <a:fld id="{F1D7F553-83A2-474A-AF03-A72461EB2CE0}" type="datetimeFigureOut">
               <a:rPr lang="en-US" smtClean="0"/>
-              <a:t>6/4/2018</a:t>
+              <a:t>6/5/2018</a:t>
             </a:fld>
             <a:endParaRPr lang="en-US"/>
           </a:p>
@@ -4094,7 +4179,7 @@
           <a:p>
             <a:fld id="{F1D7F553-83A2-474A-AF03-A72461EB2CE0}" type="datetimeFigureOut">
               <a:rPr lang="en-US" smtClean="0"/>
-              <a:t>6/4/2018</a:t>
+              <a:t>6/5/2018</a:t>
             </a:fld>
             <a:endParaRPr lang="en-US"/>
           </a:p>
@@ -6033,7 +6118,14 @@
                 <a:latin typeface="Arial" pitchFamily="34" charset="0"/>
                 <a:cs typeface="Arial" pitchFamily="34" charset="0"/>
               </a:rPr>
-              <a:t>plant_area,latitude</a:t>
+              <a:t>plant_area</a:t>
+            </a:r>
+            <a:r>
+              <a:rPr lang="fr-FR" b="1" dirty="0" smtClean="0">
+                <a:latin typeface="Arial" pitchFamily="34" charset="0"/>
+                <a:cs typeface="Arial" pitchFamily="34" charset="0"/>
+              </a:rPr>
+              <a:t>, latitude</a:t>
             </a:r>
             <a:r>
               <a:rPr lang="fr-FR" b="1" dirty="0" smtClean="0">
@@ -6755,6 +6847,371 @@
     <p:extLst>
       <p:ext uri="{BB962C8B-B14F-4D97-AF65-F5344CB8AC3E}">
         <p14:creationId xmlns:p14="http://schemas.microsoft.com/office/powerpoint/2010/main" val="2053171936"/>
+      </p:ext>
+    </p:extLst>
+  </p:cSld>
+  <p:clrMapOvr>
+    <a:masterClrMapping/>
+  </p:clrMapOvr>
+  <p:timing>
+    <p:tnLst>
+      <p:par>
+        <p:cTn id="1" dur="indefinite" restart="never" nodeType="tmRoot"/>
+      </p:par>
+    </p:tnLst>
+  </p:timing>
+</p:sld>
+</file>
+
+<file path=ppt/slides/slide15.xml><?xml version="1.0" encoding="utf-8"?>
+<p:sld xmlns:a="http://schemas.openxmlformats.org/drawingml/2006/main" xmlns:r="http://schemas.openxmlformats.org/officeDocument/2006/relationships" xmlns:p="http://schemas.openxmlformats.org/presentationml/2006/main">
+  <p:cSld>
+    <p:spTree>
+      <p:nvGrpSpPr>
+        <p:cNvPr id="1" name=""/>
+        <p:cNvGrpSpPr/>
+        <p:nvPr/>
+      </p:nvGrpSpPr>
+      <p:grpSpPr>
+        <a:xfrm>
+          <a:off x="0" y="0"/>
+          <a:ext cx="0" cy="0"/>
+          <a:chOff x="0" y="0"/>
+          <a:chExt cx="0" cy="0"/>
+        </a:xfrm>
+      </p:grpSpPr>
+      <p:sp>
+        <p:nvSpPr>
+          <p:cNvPr id="6" name="Espace réservé du numéro de diapositive 5"/>
+          <p:cNvSpPr>
+            <a:spLocks noGrp="1"/>
+          </p:cNvSpPr>
+          <p:nvPr>
+            <p:ph type="sldNum" sz="quarter" idx="12"/>
+          </p:nvPr>
+        </p:nvSpPr>
+        <p:spPr/>
+        <p:txBody>
+          <a:bodyPr/>
+          <a:lstStyle/>
+          <a:p>
+            <a:fld id="{2531D56F-F549-4EBF-B1D6-9551191C4E35}" type="slidenum">
+              <a:rPr lang="en-US" smtClean="0">
+                <a:latin typeface="Arial" pitchFamily="34" charset="0"/>
+                <a:cs typeface="Arial" pitchFamily="34" charset="0"/>
+              </a:rPr>
+              <a:t>15</a:t>
+            </a:fld>
+            <a:endParaRPr lang="en-US" dirty="0">
+              <a:latin typeface="Arial" pitchFamily="34" charset="0"/>
+              <a:cs typeface="Arial" pitchFamily="34" charset="0"/>
+            </a:endParaRPr>
+          </a:p>
+        </p:txBody>
+      </p:sp>
+      <p:sp>
+        <p:nvSpPr>
+          <p:cNvPr id="11" name="Titre 1"/>
+          <p:cNvSpPr txBox="1">
+            <a:spLocks/>
+          </p:cNvSpPr>
+          <p:nvPr/>
+        </p:nvSpPr>
+        <p:spPr>
+          <a:xfrm>
+            <a:off x="475456" y="-1"/>
+            <a:ext cx="8229600" cy="809329"/>
+          </a:xfrm>
+          <a:prstGeom prst="rect">
+            <a:avLst/>
+          </a:prstGeom>
+        </p:spPr>
+        <p:txBody>
+          <a:bodyPr vert="horz" lIns="91440" tIns="45720" rIns="91440" bIns="45720" rtlCol="0" anchor="ctr">
+            <a:normAutofit/>
+          </a:bodyPr>
+          <a:lstStyle>
+            <a:lvl1pPr algn="ctr" defTabSz="914400" rtl="0" eaLnBrk="1" latinLnBrk="0" hangingPunct="1">
+              <a:spcBef>
+                <a:spcPct val="0"/>
+              </a:spcBef>
+              <a:buNone/>
+              <a:defRPr sz="4400" kern="1200">
+                <a:solidFill>
+                  <a:schemeClr val="tx1"/>
+                </a:solidFill>
+                <a:latin typeface="+mj-lt"/>
+                <a:ea typeface="+mj-ea"/>
+                <a:cs typeface="+mj-cs"/>
+              </a:defRPr>
+            </a:lvl1pPr>
+          </a:lstStyle>
+          <a:p>
+            <a:r>
+              <a:rPr lang="en-US" sz="2800" dirty="0" smtClean="0">
+                <a:solidFill>
+                  <a:schemeClr val="bg1">
+                    <a:lumMod val="95000"/>
+                  </a:schemeClr>
+                </a:solidFill>
+                <a:latin typeface="Arial" pitchFamily="34" charset="0"/>
+                <a:cs typeface="Arial" pitchFamily="34" charset="0"/>
+              </a:rPr>
+              <a:t>SUPPORT DU TD</a:t>
+            </a:r>
+            <a:endParaRPr lang="en-US" sz="2800" dirty="0">
+              <a:solidFill>
+                <a:schemeClr val="bg1">
+                  <a:lumMod val="95000"/>
+                </a:schemeClr>
+              </a:solidFill>
+              <a:latin typeface="Arial" pitchFamily="34" charset="0"/>
+              <a:cs typeface="Arial" pitchFamily="34" charset="0"/>
+            </a:endParaRPr>
+          </a:p>
+        </p:txBody>
+      </p:sp>
+      <p:sp>
+        <p:nvSpPr>
+          <p:cNvPr id="7" name="Rectangle 2"/>
+          <p:cNvSpPr txBox="1">
+            <a:spLocks noChangeArrowheads="1"/>
+          </p:cNvSpPr>
+          <p:nvPr/>
+        </p:nvSpPr>
+        <p:spPr>
+          <a:xfrm>
+            <a:off x="0" y="0"/>
+            <a:ext cx="9144000" cy="914400"/>
+          </a:xfrm>
+          <a:prstGeom prst="rect">
+            <a:avLst/>
+          </a:prstGeom>
+          <a:solidFill>
+            <a:schemeClr val="bg1"/>
+          </a:solidFill>
+        </p:spPr>
+        <p:txBody>
+          <a:bodyPr vert="horz" lIns="91440" tIns="45720" rIns="91440" bIns="45720" rtlCol="0" anchor="ctr">
+            <a:normAutofit/>
+          </a:bodyPr>
+          <a:lstStyle>
+            <a:lvl1pPr algn="ctr" defTabSz="914400" rtl="0" eaLnBrk="1" latinLnBrk="0" hangingPunct="1">
+              <a:spcBef>
+                <a:spcPct val="0"/>
+              </a:spcBef>
+              <a:buNone/>
+              <a:defRPr sz="4400" kern="1200">
+                <a:solidFill>
+                  <a:schemeClr val="tx1"/>
+                </a:solidFill>
+                <a:latin typeface="+mj-lt"/>
+                <a:ea typeface="+mj-ea"/>
+                <a:cs typeface="+mj-cs"/>
+              </a:defRPr>
+            </a:lvl1pPr>
+          </a:lstStyle>
+          <a:p>
+            <a:pPr>
+              <a:defRPr/>
+            </a:pPr>
+            <a:r>
+              <a:rPr lang="en-US" sz="4000" dirty="0" smtClean="0">
+                <a:latin typeface="Times New Roman" pitchFamily="18" charset="0"/>
+                <a:cs typeface="Times New Roman" pitchFamily="18" charset="0"/>
+              </a:rPr>
+              <a:t>Pour </a:t>
+            </a:r>
+            <a:r>
+              <a:rPr lang="en-US" sz="4000" dirty="0" err="1" smtClean="0">
+                <a:latin typeface="Times New Roman" pitchFamily="18" charset="0"/>
+                <a:cs typeface="Times New Roman" pitchFamily="18" charset="0"/>
+              </a:rPr>
+              <a:t>aller</a:t>
+            </a:r>
+            <a:r>
+              <a:rPr lang="en-US" sz="4000" dirty="0" smtClean="0">
+                <a:latin typeface="Times New Roman" pitchFamily="18" charset="0"/>
+                <a:cs typeface="Times New Roman" pitchFamily="18" charset="0"/>
+              </a:rPr>
+              <a:t> plus loin…</a:t>
+            </a:r>
+            <a:endParaRPr lang="en-US" sz="4000" dirty="0">
+              <a:latin typeface="Times New Roman" pitchFamily="18" charset="0"/>
+              <a:cs typeface="Times New Roman" pitchFamily="18" charset="0"/>
+            </a:endParaRPr>
+          </a:p>
+        </p:txBody>
+      </p:sp>
+      <p:sp>
+        <p:nvSpPr>
+          <p:cNvPr id="8" name="Rectangle 7"/>
+          <p:cNvSpPr/>
+          <p:nvPr/>
+        </p:nvSpPr>
+        <p:spPr>
+          <a:xfrm>
+            <a:off x="670400" y="1556792"/>
+            <a:ext cx="7803200" cy="1477328"/>
+          </a:xfrm>
+          <a:prstGeom prst="rect">
+            <a:avLst/>
+          </a:prstGeom>
+        </p:spPr>
+        <p:txBody>
+          <a:bodyPr wrap="square">
+            <a:spAutoFit/>
+          </a:bodyPr>
+          <a:lstStyle/>
+          <a:p>
+            <a:pPr marL="285750" indent="-285750">
+              <a:buFont typeface="Wingdings"/>
+              <a:buChar char="à"/>
+            </a:pPr>
+            <a:r>
+              <a:rPr lang="fr-FR" b="1" dirty="0" smtClean="0">
+                <a:latin typeface="Arial" pitchFamily="34" charset="0"/>
+                <a:cs typeface="Arial" pitchFamily="34" charset="0"/>
+                <a:sym typeface="Wingdings" pitchFamily="2" charset="2"/>
+              </a:rPr>
+              <a:t>Analyser la sensibilité à l’interception cumulée (</a:t>
+            </a:r>
+            <a:r>
+              <a:rPr lang="fr-FR" b="1" dirty="0" err="1" smtClean="0">
+                <a:latin typeface="Arial" pitchFamily="34" charset="0"/>
+                <a:cs typeface="Arial" pitchFamily="34" charset="0"/>
+                <a:sym typeface="Wingdings" pitchFamily="2" charset="2"/>
+              </a:rPr>
+              <a:t>I_cmul</a:t>
+            </a:r>
+            <a:r>
+              <a:rPr lang="fr-FR" b="1" dirty="0" smtClean="0">
+                <a:latin typeface="Arial" pitchFamily="34" charset="0"/>
+                <a:cs typeface="Arial" pitchFamily="34" charset="0"/>
+                <a:sym typeface="Wingdings" pitchFamily="2" charset="2"/>
+              </a:rPr>
+              <a:t>) au cours du cycle à partir des simulation effectuées à différents stades (</a:t>
+            </a:r>
+            <a:r>
+              <a:rPr lang="fr-FR" b="1" dirty="0" err="1" smtClean="0">
+                <a:latin typeface="Arial" pitchFamily="34" charset="0"/>
+                <a:cs typeface="Arial" pitchFamily="34" charset="0"/>
+                <a:sym typeface="Wingdings" pitchFamily="2" charset="2"/>
+              </a:rPr>
+              <a:t>outputs_stade</a:t>
+            </a:r>
+            <a:r>
+              <a:rPr lang="fr-FR" b="1" dirty="0" smtClean="0">
+                <a:latin typeface="Arial" pitchFamily="34" charset="0"/>
+                <a:cs typeface="Arial" pitchFamily="34" charset="0"/>
+                <a:sym typeface="Wingdings" pitchFamily="2" charset="2"/>
+              </a:rPr>
+              <a:t>) et pour chacun des environnement étudiés</a:t>
+            </a:r>
+          </a:p>
+          <a:p>
+            <a:pPr marL="285750" indent="-285750">
+              <a:buFont typeface="Wingdings"/>
+              <a:buChar char="à"/>
+            </a:pPr>
+            <a:endParaRPr lang="fr-FR" b="1" dirty="0">
+              <a:latin typeface="Arial" pitchFamily="34" charset="0"/>
+              <a:cs typeface="Arial" pitchFamily="34" charset="0"/>
+              <a:sym typeface="Wingdings" pitchFamily="2" charset="2"/>
+            </a:endParaRPr>
+          </a:p>
+          <a:p>
+            <a:pPr marL="285750" indent="-285750">
+              <a:buFont typeface="Wingdings"/>
+              <a:buChar char="à"/>
+            </a:pPr>
+            <a:r>
+              <a:rPr lang="fr-FR" b="1" dirty="0" smtClean="0">
+                <a:latin typeface="Arial" pitchFamily="34" charset="0"/>
+                <a:cs typeface="Arial" pitchFamily="34" charset="0"/>
+                <a:sym typeface="Wingdings" pitchFamily="2" charset="2"/>
+              </a:rPr>
+              <a:t>Y a-t-il de nouveaux </a:t>
+            </a:r>
+            <a:r>
+              <a:rPr lang="fr-FR" b="1" dirty="0" err="1" smtClean="0">
+                <a:latin typeface="Arial" pitchFamily="34" charset="0"/>
+                <a:cs typeface="Arial" pitchFamily="34" charset="0"/>
+                <a:sym typeface="Wingdings" pitchFamily="2" charset="2"/>
+              </a:rPr>
+              <a:t>idéoytpes</a:t>
+            </a:r>
+            <a:r>
+              <a:rPr lang="fr-FR" b="1" dirty="0" smtClean="0">
+                <a:latin typeface="Arial" pitchFamily="34" charset="0"/>
+                <a:cs typeface="Arial" pitchFamily="34" charset="0"/>
+                <a:sym typeface="Wingdings" pitchFamily="2" charset="2"/>
+              </a:rPr>
+              <a:t>? Discutez…</a:t>
+            </a:r>
+            <a:endParaRPr lang="fr-FR" b="1" dirty="0" smtClean="0">
+              <a:latin typeface="Arial" pitchFamily="34" charset="0"/>
+              <a:cs typeface="Arial" pitchFamily="34" charset="0"/>
+              <a:sym typeface="Wingdings" pitchFamily="2" charset="2"/>
+            </a:endParaRPr>
+          </a:p>
+        </p:txBody>
+      </p:sp>
+      <p:sp>
+        <p:nvSpPr>
+          <p:cNvPr id="10" name="Rectangle 9"/>
+          <p:cNvSpPr/>
+          <p:nvPr/>
+        </p:nvSpPr>
+        <p:spPr>
+          <a:xfrm>
+            <a:off x="611560" y="3068960"/>
+            <a:ext cx="7803200" cy="923330"/>
+          </a:xfrm>
+          <a:prstGeom prst="rect">
+            <a:avLst/>
+          </a:prstGeom>
+        </p:spPr>
+        <p:txBody>
+          <a:bodyPr wrap="square">
+            <a:spAutoFit/>
+          </a:bodyPr>
+          <a:lstStyle/>
+          <a:p>
+            <a:pPr marL="285750" indent="-285750">
+              <a:buFont typeface="Wingdings"/>
+              <a:buChar char="à"/>
+            </a:pPr>
+            <a:endParaRPr lang="fr-FR" b="1" dirty="0">
+              <a:latin typeface="Arial" pitchFamily="34" charset="0"/>
+              <a:cs typeface="Arial" pitchFamily="34" charset="0"/>
+              <a:sym typeface="Wingdings" pitchFamily="2" charset="2"/>
+            </a:endParaRPr>
+          </a:p>
+          <a:p>
+            <a:pPr marL="285750" indent="-285750">
+              <a:buFont typeface="Wingdings"/>
+              <a:buChar char="à"/>
+            </a:pPr>
+            <a:endParaRPr lang="fr-FR" b="1" dirty="0" smtClean="0">
+              <a:latin typeface="Arial" pitchFamily="34" charset="0"/>
+              <a:cs typeface="Arial" pitchFamily="34" charset="0"/>
+              <a:sym typeface="Wingdings" pitchFamily="2" charset="2"/>
+            </a:endParaRPr>
+          </a:p>
+          <a:p>
+            <a:pPr marL="285750" indent="-285750">
+              <a:buFont typeface="Wingdings"/>
+              <a:buChar char="à"/>
+            </a:pPr>
+            <a:endParaRPr lang="en-US" dirty="0"/>
+          </a:p>
+        </p:txBody>
+      </p:sp>
+    </p:spTree>
+    <p:extLst>
+      <p:ext uri="{BB962C8B-B14F-4D97-AF65-F5344CB8AC3E}">
+        <p14:creationId xmlns:p14="http://schemas.microsoft.com/office/powerpoint/2010/main" val="1593820625"/>
       </p:ext>
     </p:extLst>
   </p:cSld>
@@ -8763,7 +9220,17 @@
                 <a:latin typeface="Arial" pitchFamily="34" charset="0"/>
                 <a:cs typeface="Arial" pitchFamily="34" charset="0"/>
               </a:rPr>
-              <a:t>3D_Maize_parameters_solution.ipyn</a:t>
+              <a:t>3D_visualization_output.ipyn</a:t>
+            </a:r>
+            <a:r>
+              <a:rPr lang="en-US" sz="2400" dirty="0" smtClean="0">
+                <a:solidFill>
+                  <a:srgbClr val="002060"/>
+                </a:solidFill>
+                <a:latin typeface="Arial" pitchFamily="34" charset="0"/>
+                <a:cs typeface="Arial" pitchFamily="34" charset="0"/>
+              </a:rPr>
+              <a:t/>
             </a:r>
             <a:br>
               <a:rPr lang="en-US" sz="2400" dirty="0" smtClean="0">
@@ -10549,7 +11016,7 @@
         <p:spPr>
           <a:xfrm>
             <a:off x="475456" y="1873009"/>
-            <a:ext cx="4437497" cy="2585323"/>
+            <a:ext cx="4726037" cy="2585323"/>
           </a:xfrm>
           <a:prstGeom prst="rect">
             <a:avLst/>
@@ -10562,6 +11029,10 @@
           </a:bodyPr>
           <a:lstStyle/>
           <a:p>
+            <a:pPr marL="285750" indent="-285750">
+              <a:buFont typeface="Arial" pitchFamily="34" charset="0"/>
+              <a:buChar char="•"/>
+            </a:pPr>
             <a:r>
               <a:rPr lang="en-US" dirty="0" err="1" smtClean="0"/>
               <a:t>Discrétisation</a:t>
@@ -10580,6 +11051,10 @@
             <a:endParaRPr lang="en-US" dirty="0"/>
           </a:p>
           <a:p>
+            <a:pPr marL="285750" indent="-285750">
+              <a:buFont typeface="Arial" pitchFamily="34" charset="0"/>
+              <a:buChar char="•"/>
+            </a:pPr>
             <a:r>
               <a:rPr lang="en-US" dirty="0" smtClean="0"/>
               <a:t>Point de </a:t>
@@ -10605,6 +11080,10 @@
             <a:endParaRPr lang="en-US" dirty="0" smtClean="0"/>
           </a:p>
           <a:p>
+            <a:pPr marL="285750" indent="-285750">
+              <a:buFont typeface="Arial" pitchFamily="34" charset="0"/>
+              <a:buChar char="•"/>
+            </a:pPr>
             <a:r>
               <a:rPr lang="en-US" dirty="0" err="1" smtClean="0"/>
               <a:t>Déplacement</a:t>
@@ -10650,6 +11129,10 @@
             <a:endParaRPr lang="en-US" dirty="0"/>
           </a:p>
           <a:p>
+            <a:pPr marL="285750" indent="-285750">
+              <a:buFont typeface="Arial" pitchFamily="34" charset="0"/>
+              <a:buChar char="•"/>
+            </a:pPr>
             <a:r>
               <a:rPr lang="en-US" dirty="0" smtClean="0"/>
               <a:t>1 </a:t>

</xml_diff>